<commit_message>
Info about Constraint ID
</commit_message>
<xml_diff>
--- a/SDMX Matrix Generator User Guide.pptx
+++ b/SDMX Matrix Generator User Guide.pptx
@@ -4082,8 +4082,8 @@
   <dgm:cxnLst>
     <dgm:cxn modelId="{09226881-8F0D-4A9F-A507-BAD659FB3B65}" type="presOf" srcId="{F93CB5D6-FFB9-45DF-85D1-4A43A3B3706E}" destId="{CC7E943C-5B99-4E6C-A20B-FB7FC34C73F8}" srcOrd="0" destOrd="0" presId="urn:microsoft.com/office/officeart/2005/8/layout/chevron1"/>
     <dgm:cxn modelId="{1AB0330D-077D-4F8A-AD14-46AC4C062027}" type="presOf" srcId="{5C712442-7D6D-435F-8FFB-AF663470ADC8}" destId="{4C2F150F-0411-49DD-8AC7-13B69B973642}" srcOrd="0" destOrd="0" presId="urn:microsoft.com/office/officeart/2005/8/layout/chevron1"/>
+    <dgm:cxn modelId="{0E0BF7C9-179E-45AA-A0D2-32E71F430749}" type="presOf" srcId="{F9046349-62F7-432E-B8F0-E00DDBF13256}" destId="{19D11876-6F17-424D-BACB-47A96D3DF1F7}" srcOrd="0" destOrd="0" presId="urn:microsoft.com/office/officeart/2005/8/layout/chevron1"/>
     <dgm:cxn modelId="{5559C55A-84FA-4D62-A38D-BB616E5D8D41}" srcId="{F9046349-62F7-432E-B8F0-E00DDBF13256}" destId="{F93CB5D6-FFB9-45DF-85D1-4A43A3B3706E}" srcOrd="2" destOrd="0" parTransId="{D43C181C-4FAC-4F9F-A26C-05BDA1E460FE}" sibTransId="{B8165244-73CB-4D83-A32B-0EED6E6031FA}"/>
-    <dgm:cxn modelId="{0E0BF7C9-179E-45AA-A0D2-32E71F430749}" type="presOf" srcId="{F9046349-62F7-432E-B8F0-E00DDBF13256}" destId="{19D11876-6F17-424D-BACB-47A96D3DF1F7}" srcOrd="0" destOrd="0" presId="urn:microsoft.com/office/officeart/2005/8/layout/chevron1"/>
     <dgm:cxn modelId="{EF260A53-4FF6-42EC-AC94-ECA90AB8A5D2}" type="presOf" srcId="{E0D30344-939B-4B50-8F94-866DF243B2F7}" destId="{3A07515E-7050-4DDA-AFBB-EDDA4F2854E7}" srcOrd="0" destOrd="0" presId="urn:microsoft.com/office/officeart/2005/8/layout/chevron1"/>
     <dgm:cxn modelId="{C1866E7C-F29C-4698-A5AD-4AF150586BAA}" srcId="{F9046349-62F7-432E-B8F0-E00DDBF13256}" destId="{5C712442-7D6D-435F-8FFB-AF663470ADC8}" srcOrd="0" destOrd="0" parTransId="{E3E95FD2-06EB-4660-A372-8A9E4A6CDA01}" sibTransId="{8983AD4C-1DED-45D3-8668-FBF1A58C81E2}"/>
     <dgm:cxn modelId="{4FFA3608-BF13-4BCB-B4B2-3F4E8F37812F}" srcId="{F9046349-62F7-432E-B8F0-E00DDBF13256}" destId="{E0D30344-939B-4B50-8F94-866DF243B2F7}" srcOrd="1" destOrd="0" parTransId="{9D795A23-24D7-4EBE-B923-A3539D159624}" sibTransId="{15F7724E-3207-4719-B034-2158214F3A38}"/>
@@ -4338,7 +4338,7 @@
         <a:lstStyle/>
         <a:p>
           <a:r>
-            <a:rPr lang="en-US" sz="1200"/>
+            <a:rPr lang="en-US" sz="1200" dirty="0"/>
             <a:t>Constraints</a:t>
           </a:r>
         </a:p>
@@ -4594,8 +4594,8 @@
     <dgm:cxn modelId="{EF260A53-4FF6-42EC-AC94-ECA90AB8A5D2}" type="presOf" srcId="{E0D30344-939B-4B50-8F94-866DF243B2F7}" destId="{3A07515E-7050-4DDA-AFBB-EDDA4F2854E7}" srcOrd="0" destOrd="0" presId="urn:microsoft.com/office/officeart/2005/8/layout/chevron1"/>
     <dgm:cxn modelId="{A464FDEE-CD9B-4C71-84C9-60C16656B9B8}" type="presOf" srcId="{1D144A17-FCF9-41E6-BF9E-E0BDD71092E2}" destId="{6AA2FB66-E4AC-4BB6-A23B-A128E702F3BD}" srcOrd="0" destOrd="0" presId="urn:microsoft.com/office/officeart/2005/8/layout/chevron1"/>
     <dgm:cxn modelId="{2493CB2E-6AC9-4DB1-8A31-E48B34F41A56}" type="presOf" srcId="{F1363C03-C904-4BB6-BB98-3B538AB53AF6}" destId="{08D4D8F1-6210-43CD-9D6D-E2B207FF2C23}" srcOrd="0" destOrd="0" presId="urn:microsoft.com/office/officeart/2005/8/layout/chevron1"/>
+    <dgm:cxn modelId="{0E0BF7C9-179E-45AA-A0D2-32E71F430749}" type="presOf" srcId="{F9046349-62F7-432E-B8F0-E00DDBF13256}" destId="{19D11876-6F17-424D-BACB-47A96D3DF1F7}" srcOrd="0" destOrd="0" presId="urn:microsoft.com/office/officeart/2005/8/layout/chevron1"/>
     <dgm:cxn modelId="{31D09F21-63BC-49FE-AB4F-725EBB2FD278}" type="presOf" srcId="{4E30AE71-8383-4D68-992F-A356261564EF}" destId="{15A22A56-27F4-49E6-811F-765CDBF66437}" srcOrd="0" destOrd="0" presId="urn:microsoft.com/office/officeart/2005/8/layout/chevron1"/>
-    <dgm:cxn modelId="{0E0BF7C9-179E-45AA-A0D2-32E71F430749}" type="presOf" srcId="{F9046349-62F7-432E-B8F0-E00DDBF13256}" destId="{19D11876-6F17-424D-BACB-47A96D3DF1F7}" srcOrd="0" destOrd="0" presId="urn:microsoft.com/office/officeart/2005/8/layout/chevron1"/>
     <dgm:cxn modelId="{09226881-8F0D-4A9F-A507-BAD659FB3B65}" type="presOf" srcId="{F93CB5D6-FFB9-45DF-85D1-4A43A3B3706E}" destId="{CC7E943C-5B99-4E6C-A20B-FB7FC34C73F8}" srcOrd="0" destOrd="0" presId="urn:microsoft.com/office/officeart/2005/8/layout/chevron1"/>
     <dgm:cxn modelId="{F4E4308A-54F2-42BA-9F68-7D96635B5656}" srcId="{F9046349-62F7-432E-B8F0-E00DDBF13256}" destId="{4E30AE71-8383-4D68-992F-A356261564EF}" srcOrd="1" destOrd="0" parTransId="{67272E9A-7472-4875-BD45-227D4B4C5A80}" sibTransId="{B7A50BC0-8C76-4B2A-9C6B-1541A3173249}"/>
     <dgm:cxn modelId="{44F9563D-73D7-489A-804F-099F73B92543}" srcId="{F9046349-62F7-432E-B8F0-E00DDBF13256}" destId="{F1363C03-C904-4BB6-BB98-3B538AB53AF6}" srcOrd="4" destOrd="0" parTransId="{445E1530-6511-4CA8-9BF3-A89BD4EE5682}" sibTransId="{536AFEF9-63C2-4CD4-96E8-D53E4303A05B}"/>
@@ -4682,11 +4682,7 @@
           </a:r>
           <a:r>
             <a:rPr lang="en-US" sz="1600" dirty="0" smtClean="0"/>
-            <a:t> </a:t>
-          </a:r>
-          <a:r>
-            <a:rPr lang="en-US" sz="1600" dirty="0" smtClean="0"/>
-            <a:t>(edit, change Identifiers)</a:t>
+            <a:t> (edit, change Identifiers)</a:t>
           </a:r>
           <a:endParaRPr lang="en-US" sz="1600" dirty="0"/>
         </a:p>
@@ -4938,16 +4934,16 @@
   </dgm:ptLst>
   <dgm:cxnLst>
     <dgm:cxn modelId="{184CB7D9-BB00-4A62-81FE-A9CAA3226A01}" srcId="{F9046349-62F7-432E-B8F0-E00DDBF13256}" destId="{E1562295-F7B7-4EFF-9135-7EC4AAC899B3}" srcOrd="0" destOrd="0" parTransId="{5BB9F75F-A65B-4F77-A0F8-F47C755CCF29}" sibTransId="{76D79678-0460-454C-A35F-E923ADD787AA}"/>
+    <dgm:cxn modelId="{09226881-8F0D-4A9F-A507-BAD659FB3B65}" type="presOf" srcId="{F93CB5D6-FFB9-45DF-85D1-4A43A3B3706E}" destId="{CC7E943C-5B99-4E6C-A20B-FB7FC34C73F8}" srcOrd="0" destOrd="0" presId="urn:microsoft.com/office/officeart/2005/8/layout/chevron1"/>
+    <dgm:cxn modelId="{F2B4CFE0-1F00-485D-A0F6-2AE0BD5E1ABD}" type="presOf" srcId="{A156CCBC-2190-4B3B-AA5B-926932676E0A}" destId="{D38AA053-A835-4969-B8C4-D06D038D399B}" srcOrd="0" destOrd="0" presId="urn:microsoft.com/office/officeart/2005/8/layout/chevron1"/>
+    <dgm:cxn modelId="{5107774F-7F93-4A2F-BF40-6515B440D504}" srcId="{F9046349-62F7-432E-B8F0-E00DDBF13256}" destId="{35FCA027-20E0-4C22-8FA3-FCB642C0C051}" srcOrd="2" destOrd="0" parTransId="{3E3B6578-A123-46D4-A0FD-BB258650647E}" sibTransId="{5500A8D2-2DA0-4230-82E7-93E3534670CD}"/>
+    <dgm:cxn modelId="{723FE56F-FFB7-488B-8D74-3B8AE71E0CC8}" type="presOf" srcId="{35FCA027-20E0-4C22-8FA3-FCB642C0C051}" destId="{3BEBA7DE-EE3D-47FE-AA84-5FDC98E37219}" srcOrd="0" destOrd="0" presId="urn:microsoft.com/office/officeart/2005/8/layout/chevron1"/>
+    <dgm:cxn modelId="{42FBC066-9342-419E-9ADB-06F02107ACD6}" srcId="{F9046349-62F7-432E-B8F0-E00DDBF13256}" destId="{A156CCBC-2190-4B3B-AA5B-926932676E0A}" srcOrd="3" destOrd="0" parTransId="{40761BE0-8DAF-4C50-BED9-DE52888F05F6}" sibTransId="{0E370449-3C0D-462F-8E7B-05E873B0397F}"/>
+    <dgm:cxn modelId="{5559C55A-84FA-4D62-A38D-BB616E5D8D41}" srcId="{F9046349-62F7-432E-B8F0-E00DDBF13256}" destId="{F93CB5D6-FFB9-45DF-85D1-4A43A3B3706E}" srcOrd="4" destOrd="0" parTransId="{D43C181C-4FAC-4F9F-A26C-05BDA1E460FE}" sibTransId="{B8165244-73CB-4D83-A32B-0EED6E6031FA}"/>
+    <dgm:cxn modelId="{0E0BF7C9-179E-45AA-A0D2-32E71F430749}" type="presOf" srcId="{F9046349-62F7-432E-B8F0-E00DDBF13256}" destId="{19D11876-6F17-424D-BACB-47A96D3DF1F7}" srcOrd="0" destOrd="0" presId="urn:microsoft.com/office/officeart/2005/8/layout/chevron1"/>
+    <dgm:cxn modelId="{EF260A53-4FF6-42EC-AC94-ECA90AB8A5D2}" type="presOf" srcId="{E0D30344-939B-4B50-8F94-866DF243B2F7}" destId="{3A07515E-7050-4DDA-AFBB-EDDA4F2854E7}" srcOrd="0" destOrd="0" presId="urn:microsoft.com/office/officeart/2005/8/layout/chevron1"/>
     <dgm:cxn modelId="{83C6E31D-DA29-4107-B0C8-30554155D151}" type="presOf" srcId="{E1562295-F7B7-4EFF-9135-7EC4AAC899B3}" destId="{898F294B-C69B-4765-8B71-3FCD29A9BD4D}" srcOrd="0" destOrd="0" presId="urn:microsoft.com/office/officeart/2005/8/layout/chevron1"/>
     <dgm:cxn modelId="{4FFA3608-BF13-4BCB-B4B2-3F4E8F37812F}" srcId="{F9046349-62F7-432E-B8F0-E00DDBF13256}" destId="{E0D30344-939B-4B50-8F94-866DF243B2F7}" srcOrd="1" destOrd="0" parTransId="{9D795A23-24D7-4EBE-B923-A3539D159624}" sibTransId="{15F7724E-3207-4719-B034-2158214F3A38}"/>
-    <dgm:cxn modelId="{F2B4CFE0-1F00-485D-A0F6-2AE0BD5E1ABD}" type="presOf" srcId="{A156CCBC-2190-4B3B-AA5B-926932676E0A}" destId="{D38AA053-A835-4969-B8C4-D06D038D399B}" srcOrd="0" destOrd="0" presId="urn:microsoft.com/office/officeart/2005/8/layout/chevron1"/>
-    <dgm:cxn modelId="{5559C55A-84FA-4D62-A38D-BB616E5D8D41}" srcId="{F9046349-62F7-432E-B8F0-E00DDBF13256}" destId="{F93CB5D6-FFB9-45DF-85D1-4A43A3B3706E}" srcOrd="4" destOrd="0" parTransId="{D43C181C-4FAC-4F9F-A26C-05BDA1E460FE}" sibTransId="{B8165244-73CB-4D83-A32B-0EED6E6031FA}"/>
-    <dgm:cxn modelId="{42FBC066-9342-419E-9ADB-06F02107ACD6}" srcId="{F9046349-62F7-432E-B8F0-E00DDBF13256}" destId="{A156CCBC-2190-4B3B-AA5B-926932676E0A}" srcOrd="3" destOrd="0" parTransId="{40761BE0-8DAF-4C50-BED9-DE52888F05F6}" sibTransId="{0E370449-3C0D-462F-8E7B-05E873B0397F}"/>
-    <dgm:cxn modelId="{EF260A53-4FF6-42EC-AC94-ECA90AB8A5D2}" type="presOf" srcId="{E0D30344-939B-4B50-8F94-866DF243B2F7}" destId="{3A07515E-7050-4DDA-AFBB-EDDA4F2854E7}" srcOrd="0" destOrd="0" presId="urn:microsoft.com/office/officeart/2005/8/layout/chevron1"/>
-    <dgm:cxn modelId="{723FE56F-FFB7-488B-8D74-3B8AE71E0CC8}" type="presOf" srcId="{35FCA027-20E0-4C22-8FA3-FCB642C0C051}" destId="{3BEBA7DE-EE3D-47FE-AA84-5FDC98E37219}" srcOrd="0" destOrd="0" presId="urn:microsoft.com/office/officeart/2005/8/layout/chevron1"/>
-    <dgm:cxn modelId="{0E0BF7C9-179E-45AA-A0D2-32E71F430749}" type="presOf" srcId="{F9046349-62F7-432E-B8F0-E00DDBF13256}" destId="{19D11876-6F17-424D-BACB-47A96D3DF1F7}" srcOrd="0" destOrd="0" presId="urn:microsoft.com/office/officeart/2005/8/layout/chevron1"/>
-    <dgm:cxn modelId="{09226881-8F0D-4A9F-A507-BAD659FB3B65}" type="presOf" srcId="{F93CB5D6-FFB9-45DF-85D1-4A43A3B3706E}" destId="{CC7E943C-5B99-4E6C-A20B-FB7FC34C73F8}" srcOrd="0" destOrd="0" presId="urn:microsoft.com/office/officeart/2005/8/layout/chevron1"/>
-    <dgm:cxn modelId="{5107774F-7F93-4A2F-BF40-6515B440D504}" srcId="{F9046349-62F7-432E-B8F0-E00DDBF13256}" destId="{35FCA027-20E0-4C22-8FA3-FCB642C0C051}" srcOrd="2" destOrd="0" parTransId="{3E3B6578-A123-46D4-A0FD-BB258650647E}" sibTransId="{5500A8D2-2DA0-4230-82E7-93E3534670CD}"/>
     <dgm:cxn modelId="{14E8AD83-3514-401E-B9BC-39BFF80D95AF}" type="presParOf" srcId="{19D11876-6F17-424D-BACB-47A96D3DF1F7}" destId="{898F294B-C69B-4765-8B71-3FCD29A9BD4D}" srcOrd="0" destOrd="0" presId="urn:microsoft.com/office/officeart/2005/8/layout/chevron1"/>
     <dgm:cxn modelId="{3E898130-8526-462C-BE45-CA515C7833BC}" type="presParOf" srcId="{19D11876-6F17-424D-BACB-47A96D3DF1F7}" destId="{B45D67BA-99D6-4D19-A494-EE22F606F710}" srcOrd="1" destOrd="0" presId="urn:microsoft.com/office/officeart/2005/8/layout/chevron1"/>
     <dgm:cxn modelId="{B5D02B94-F7EC-4AEA-9BDE-7BD120167CFA}" type="presParOf" srcId="{19D11876-6F17-424D-BACB-47A96D3DF1F7}" destId="{3A07515E-7050-4DDA-AFBB-EDDA4F2854E7}" srcOrd="2" destOrd="0" presId="urn:microsoft.com/office/officeart/2005/8/layout/chevron1"/>
@@ -5238,15 +5234,7 @@
           </a:r>
           <a:r>
             <a:rPr lang="en-US" sz="2400" dirty="0" smtClean="0"/>
-            <a:t> </a:t>
-          </a:r>
-          <a:r>
-            <a:rPr lang="en-US" sz="2400" dirty="0" smtClean="0"/>
-            <a:t>(edit</a:t>
-          </a:r>
-          <a:r>
-            <a:rPr lang="en-US" sz="2400" dirty="0" smtClean="0"/>
-            <a:t>)</a:t>
+            <a:t> (edit)</a:t>
           </a:r>
           <a:endParaRPr lang="en-US" sz="2400" dirty="0"/>
         </a:p>
@@ -6206,7 +6194,7 @@
             </a:spcAft>
           </a:pPr>
           <a:r>
-            <a:rPr lang="en-US" sz="1200" kern="1200"/>
+            <a:rPr lang="en-US" sz="1200" kern="1200" dirty="0"/>
             <a:t>Constraints</a:t>
           </a:r>
         </a:p>
@@ -6459,11 +6447,7 @@
           </a:r>
           <a:r>
             <a:rPr lang="en-US" sz="1600" kern="1200" dirty="0" smtClean="0"/>
-            <a:t> </a:t>
-          </a:r>
-          <a:r>
-            <a:rPr lang="en-US" sz="1600" kern="1200" dirty="0" smtClean="0"/>
-            <a:t>(edit, change Identifiers)</a:t>
+            <a:t> (edit, change Identifiers)</a:t>
           </a:r>
           <a:endParaRPr lang="en-US" sz="1600" kern="1200" dirty="0"/>
         </a:p>
@@ -7115,15 +7099,7 @@
           </a:r>
           <a:r>
             <a:rPr lang="en-US" sz="2400" kern="1200" dirty="0" smtClean="0"/>
-            <a:t> </a:t>
-          </a:r>
-          <a:r>
-            <a:rPr lang="en-US" sz="2400" kern="1200" dirty="0" smtClean="0"/>
-            <a:t>(edit</a:t>
-          </a:r>
-          <a:r>
-            <a:rPr lang="en-US" sz="2400" kern="1200" dirty="0" smtClean="0"/>
-            <a:t>)</a:t>
+            <a:t> (edit)</a:t>
           </a:r>
           <a:endParaRPr lang="en-US" sz="2400" kern="1200" dirty="0"/>
         </a:p>
@@ -13930,7 +13906,7 @@
           <a:p>
             <a:fld id="{92318C2D-4A4F-4C4D-AEA4-5E6CBF993B13}" type="datetimeFigureOut">
               <a:rPr lang="de-DE" smtClean="0"/>
-              <a:t>12.06.2020</a:t>
+              <a:t>23.07.2020</a:t>
             </a:fld>
             <a:endParaRPr lang="de-DE"/>
           </a:p>
@@ -14100,7 +14076,7 @@
           <a:p>
             <a:fld id="{92318C2D-4A4F-4C4D-AEA4-5E6CBF993B13}" type="datetimeFigureOut">
               <a:rPr lang="de-DE" smtClean="0"/>
-              <a:t>12.06.2020</a:t>
+              <a:t>23.07.2020</a:t>
             </a:fld>
             <a:endParaRPr lang="de-DE"/>
           </a:p>
@@ -14280,7 +14256,7 @@
           <a:p>
             <a:fld id="{92318C2D-4A4F-4C4D-AEA4-5E6CBF993B13}" type="datetimeFigureOut">
               <a:rPr lang="de-DE" smtClean="0"/>
-              <a:t>12.06.2020</a:t>
+              <a:t>23.07.2020</a:t>
             </a:fld>
             <a:endParaRPr lang="de-DE"/>
           </a:p>
@@ -14450,7 +14426,7 @@
           <a:p>
             <a:fld id="{92318C2D-4A4F-4C4D-AEA4-5E6CBF993B13}" type="datetimeFigureOut">
               <a:rPr lang="de-DE" smtClean="0"/>
-              <a:t>12.06.2020</a:t>
+              <a:t>23.07.2020</a:t>
             </a:fld>
             <a:endParaRPr lang="de-DE"/>
           </a:p>
@@ -14696,7 +14672,7 @@
           <a:p>
             <a:fld id="{92318C2D-4A4F-4C4D-AEA4-5E6CBF993B13}" type="datetimeFigureOut">
               <a:rPr lang="de-DE" smtClean="0"/>
-              <a:t>12.06.2020</a:t>
+              <a:t>23.07.2020</a:t>
             </a:fld>
             <a:endParaRPr lang="de-DE"/>
           </a:p>
@@ -14928,7 +14904,7 @@
           <a:p>
             <a:fld id="{92318C2D-4A4F-4C4D-AEA4-5E6CBF993B13}" type="datetimeFigureOut">
               <a:rPr lang="de-DE" smtClean="0"/>
-              <a:t>12.06.2020</a:t>
+              <a:t>23.07.2020</a:t>
             </a:fld>
             <a:endParaRPr lang="de-DE"/>
           </a:p>
@@ -15295,7 +15271,7 @@
           <a:p>
             <a:fld id="{92318C2D-4A4F-4C4D-AEA4-5E6CBF993B13}" type="datetimeFigureOut">
               <a:rPr lang="de-DE" smtClean="0"/>
-              <a:t>12.06.2020</a:t>
+              <a:t>23.07.2020</a:t>
             </a:fld>
             <a:endParaRPr lang="de-DE"/>
           </a:p>
@@ -15413,7 +15389,7 @@
           <a:p>
             <a:fld id="{92318C2D-4A4F-4C4D-AEA4-5E6CBF993B13}" type="datetimeFigureOut">
               <a:rPr lang="de-DE" smtClean="0"/>
-              <a:t>12.06.2020</a:t>
+              <a:t>23.07.2020</a:t>
             </a:fld>
             <a:endParaRPr lang="de-DE"/>
           </a:p>
@@ -15508,7 +15484,7 @@
           <a:p>
             <a:fld id="{92318C2D-4A4F-4C4D-AEA4-5E6CBF993B13}" type="datetimeFigureOut">
               <a:rPr lang="de-DE" smtClean="0"/>
-              <a:t>12.06.2020</a:t>
+              <a:t>23.07.2020</a:t>
             </a:fld>
             <a:endParaRPr lang="de-DE"/>
           </a:p>
@@ -15785,7 +15761,7 @@
           <a:p>
             <a:fld id="{92318C2D-4A4F-4C4D-AEA4-5E6CBF993B13}" type="datetimeFigureOut">
               <a:rPr lang="de-DE" smtClean="0"/>
-              <a:t>12.06.2020</a:t>
+              <a:t>23.07.2020</a:t>
             </a:fld>
             <a:endParaRPr lang="de-DE"/>
           </a:p>
@@ -16038,7 +16014,7 @@
           <a:p>
             <a:fld id="{92318C2D-4A4F-4C4D-AEA4-5E6CBF993B13}" type="datetimeFigureOut">
               <a:rPr lang="de-DE" smtClean="0"/>
-              <a:t>12.06.2020</a:t>
+              <a:t>23.07.2020</a:t>
             </a:fld>
             <a:endParaRPr lang="de-DE"/>
           </a:p>
@@ -16251,7 +16227,7 @@
           <a:p>
             <a:fld id="{92318C2D-4A4F-4C4D-AEA4-5E6CBF993B13}" type="datetimeFigureOut">
               <a:rPr lang="de-DE" smtClean="0"/>
-              <a:t>12.06.2020</a:t>
+              <a:t>23.07.2020</a:t>
             </a:fld>
             <a:endParaRPr lang="de-DE"/>
           </a:p>
@@ -18634,7 +18610,6 @@
               <a:rPr lang="en-GB" sz="1400" dirty="0" smtClean="0"/>
               <a:t>flows. </a:t>
             </a:r>
-            <a:endParaRPr lang="en-GB" sz="1400" dirty="0" smtClean="0"/>
           </a:p>
           <a:p>
             <a:pPr marL="0" indent="0">
@@ -18692,11 +18667,7 @@
             </a:r>
             <a:r>
               <a:rPr lang="en-GB" sz="1400" dirty="0" smtClean="0"/>
-              <a:t>fields (starting with Cat.) are only required when generating Categorisations. </a:t>
-            </a:r>
-            <a:r>
-              <a:rPr lang="en-GB" sz="1400" dirty="0" smtClean="0"/>
-              <a:t>The </a:t>
+              <a:t>fields (starting with Cat.) are only required when generating Categorisations. The </a:t>
             </a:r>
             <a:r>
               <a:rPr lang="en-GB" sz="1400" dirty="0"/>
@@ -18720,35 +18691,89 @@
               <a:buNone/>
             </a:pPr>
             <a:r>
+              <a:rPr lang="en-GB" sz="1400" dirty="0" smtClean="0"/>
+              <a:t>The </a:t>
+            </a:r>
+            <a:r>
+              <a:rPr lang="en-GB" sz="1400" b="1" dirty="0" smtClean="0"/>
+              <a:t>Constraint ID</a:t>
+            </a:r>
+            <a:r>
+              <a:rPr lang="en-GB" sz="1400" dirty="0" smtClean="0"/>
+              <a:t> field allows you to manually specify the ID of the Constraint. If it is blank on generation, the ID is </a:t>
+            </a:r>
+            <a:r>
+              <a:rPr lang="en-GB" sz="1400" dirty="0" err="1" smtClean="0"/>
+              <a:t>autogenerated</a:t>
+            </a:r>
+            <a:r>
               <a:rPr lang="en-GB" sz="1400" dirty="0"/>
-              <a:t>To add a name and description language, add new columns for the required </a:t>
-            </a:r>
-            <a:r>
-              <a:rPr lang="en-GB" sz="1400" b="1" dirty="0"/>
-              <a:t>Name:&lt;language&gt; </a:t>
-            </a:r>
-            <a:r>
-              <a:rPr lang="en-GB" sz="1400" dirty="0"/>
-              <a:t>and </a:t>
-            </a:r>
-            <a:r>
-              <a:rPr lang="en-GB" sz="1400" b="1" dirty="0"/>
-              <a:t>Description:&lt;language&gt;</a:t>
-            </a:r>
-            <a:r>
-              <a:rPr lang="en-GB" sz="1400" dirty="0"/>
-              <a:t>, where &lt;language&gt; is a code from ISO </a:t>
+              <a:t> using </a:t>
             </a:r>
             <a:r>
               <a:rPr lang="en-GB" sz="1400" dirty="0" smtClean="0"/>
-              <a:t>639-1.</a:t>
-            </a:r>
+              <a:t>the </a:t>
+            </a:r>
+            <a:r>
+              <a:rPr lang="en-GB" sz="1400" b="1" dirty="0" smtClean="0"/>
+              <a:t>CR_&lt;Dataflow ID&gt;</a:t>
+            </a:r>
+            <a:r>
+              <a:rPr lang="en-GB" sz="1400" dirty="0" smtClean="0"/>
+              <a:t>. The Constraint’s agency and version always matches the Dataflow, and </a:t>
+            </a:r>
+            <a:r>
+              <a:rPr lang="en-GB" sz="1400" dirty="0" err="1" smtClean="0"/>
+              <a:t>isFinal</a:t>
+            </a:r>
+            <a:r>
+              <a:rPr lang="en-GB" sz="1400" dirty="0" smtClean="0"/>
+              <a:t> </a:t>
+            </a:r>
+            <a:r>
+              <a:rPr lang="en-GB" sz="1400" smtClean="0"/>
+              <a:t>is false.</a:t>
+            </a:r>
+            <a:endParaRPr lang="en-GB" sz="1400" b="1" dirty="0" smtClean="0"/>
           </a:p>
           <a:p>
             <a:pPr marL="0" indent="0">
               <a:buNone/>
             </a:pPr>
             <a:r>
+              <a:rPr lang="en-GB" sz="1400" dirty="0" smtClean="0"/>
+              <a:t>To </a:t>
+            </a:r>
+            <a:r>
+              <a:rPr lang="en-GB" sz="1400" dirty="0"/>
+              <a:t>add a name and description language, add new columns for the required </a:t>
+            </a:r>
+            <a:r>
+              <a:rPr lang="en-GB" sz="1400" b="1" dirty="0"/>
+              <a:t>Name:&lt;language&gt; </a:t>
+            </a:r>
+            <a:r>
+              <a:rPr lang="en-GB" sz="1400" dirty="0"/>
+              <a:t>and </a:t>
+            </a:r>
+            <a:r>
+              <a:rPr lang="en-GB" sz="1400" b="1" dirty="0"/>
+              <a:t>Description:&lt;language&gt;</a:t>
+            </a:r>
+            <a:r>
+              <a:rPr lang="en-GB" sz="1400" dirty="0"/>
+              <a:t>, where &lt;language&gt; is a code from ISO </a:t>
+            </a:r>
+            <a:r>
+              <a:rPr lang="en-GB" sz="1400" dirty="0" smtClean="0"/>
+              <a:t>639-1.</a:t>
+            </a:r>
+          </a:p>
+          <a:p>
+            <a:pPr marL="0" indent="0">
+              <a:buNone/>
+            </a:pPr>
+            <a:r>
               <a:rPr lang="en-GB" sz="1400" dirty="0"/>
               <a:t>The annotation columns, e.g. LAYOUT_ROW, </a:t>
             </a:r>
@@ -18784,28 +18809,14 @@
             </a:r>
             <a:r>
               <a:rPr lang="en-GB" sz="1400" dirty="0" smtClean="0"/>
-              <a:t> field, and several default ones are provided. More Annotations may be added by adding them horizontally in the </a:t>
-            </a:r>
+              <a:t> field, and several default ones are provided. More Annotations may be added by adding them horizontally in the header</a:t>
+            </a:r>
+          </a:p>
+          <a:p>
             <a:r>
               <a:rPr lang="en-GB" sz="1400" dirty="0" smtClean="0"/>
-              <a:t>header</a:t>
-            </a:r>
-            <a:endParaRPr lang="en-GB" sz="1400" dirty="0" smtClean="0"/>
-          </a:p>
-          <a:p>
-            <a:r>
-              <a:rPr lang="en-GB" sz="1400" dirty="0" smtClean="0"/>
-              <a:t>For a Data flow to use an Annotation, enter a value in the row for the Data flow underneath the Annotation </a:t>
-            </a:r>
-            <a:r>
-              <a:rPr lang="en-GB" sz="1400" dirty="0" smtClean="0"/>
-              <a:t>column</a:t>
-            </a:r>
-            <a:r>
-              <a:rPr lang="en-GB" sz="1400" dirty="0" smtClean="0"/>
-              <a:t>, otherwise an Annotation is not generated</a:t>
-            </a:r>
-            <a:endParaRPr lang="en-GB" sz="1400" dirty="0" smtClean="0"/>
+              <a:t>For a Data flow to use an Annotation, enter a value in the row for the Data flow underneath the Annotation column, otherwise an Annotation is not generated</a:t>
+            </a:r>
           </a:p>
           <a:p>
             <a:r>
@@ -20463,11 +20474,7 @@
           <a:p>
             <a:r>
               <a:rPr lang="en-US" dirty="0" smtClean="0"/>
-              <a:t>It </a:t>
-            </a:r>
-            <a:r>
-              <a:rPr lang="en-US" dirty="0" smtClean="0"/>
-              <a:t>can be </a:t>
+              <a:t>It can be </a:t>
             </a:r>
             <a:r>
               <a:rPr lang="en-US" dirty="0"/>
@@ -20656,19 +20663,11 @@
           <a:p>
             <a:r>
               <a:rPr lang="en-US" dirty="0" smtClean="0"/>
-              <a:t>The DSD’s Concept Scheme must be in </a:t>
-            </a:r>
-            <a:r>
-              <a:rPr lang="en-US" dirty="0" smtClean="0"/>
-              <a:t>the </a:t>
+              <a:t>The DSD’s Concept Scheme must be in the </a:t>
             </a:r>
             <a:r>
               <a:rPr lang="en-US" b="1" dirty="0" smtClean="0"/>
-              <a:t>3.Concept </a:t>
-            </a:r>
-            <a:r>
-              <a:rPr lang="en-US" b="1" dirty="0" smtClean="0"/>
-              <a:t>Scheme</a:t>
+              <a:t>3.Concept Scheme</a:t>
             </a:r>
             <a:r>
               <a:rPr lang="en-US" dirty="0" smtClean="0"/>
@@ -20708,11 +20707,7 @@
             </a:r>
             <a:r>
               <a:rPr lang="en-US" dirty="0" smtClean="0"/>
-              <a:t> </a:t>
-            </a:r>
-            <a:r>
-              <a:rPr lang="en-US" dirty="0" smtClean="0"/>
-              <a:t>worksheets</a:t>
+              <a:t> worksheets</a:t>
             </a:r>
           </a:p>
           <a:p>
@@ -20793,15 +20788,7 @@
           <a:p>
             <a:r>
               <a:rPr lang="en-GB" dirty="0" smtClean="0"/>
-              <a:t>This section shows some typical </a:t>
-            </a:r>
-            <a:r>
-              <a:rPr lang="en-GB" dirty="0" smtClean="0"/>
-              <a:t>use cases that apply to </a:t>
-            </a:r>
-            <a:r>
-              <a:rPr lang="en-GB" dirty="0" smtClean="0"/>
-              <a:t>using the SDMX Matrix Generator. See the later section on </a:t>
+              <a:t>This section shows some typical use cases that apply to using the SDMX Matrix Generator. See the later section on </a:t>
             </a:r>
             <a:r>
               <a:rPr lang="en-GB" b="1" dirty="0" smtClean="0"/>
@@ -21540,11 +21527,7 @@
             </a:pPr>
             <a:r>
               <a:rPr lang="en-US" sz="2000" dirty="0" smtClean="0"/>
-              <a:t>To </a:t>
-            </a:r>
-            <a:r>
-              <a:rPr lang="en-US" sz="2000" dirty="0" smtClean="0"/>
-              <a:t>customize a DSD, for example extend a global DSD to include local codes, do the following:</a:t>
+              <a:t>To customize a DSD, for example extend a global DSD to include local codes, do the following:</a:t>
             </a:r>
           </a:p>
           <a:p>
@@ -21562,19 +21545,11 @@
             </a:r>
             <a:r>
               <a:rPr lang="en-US" sz="2000" dirty="0" smtClean="0"/>
-              <a:t> worksheet to populate the matrix generator with the DSD. If the DSD is stored in </a:t>
-            </a:r>
-            <a:r>
-              <a:rPr lang="en-US" sz="2000" dirty="0" smtClean="0"/>
-              <a:t>a system with an SDMX REST API such as the Global Registry, put a query in the </a:t>
+              <a:t> worksheet to populate the matrix generator with the DSD. If the DSD is stored in a system with an SDMX REST API such as the Global Registry, put a query in the </a:t>
             </a:r>
             <a:r>
               <a:rPr lang="en-US" sz="2000" b="1" dirty="0" smtClean="0"/>
-              <a:t>REST </a:t>
-            </a:r>
-            <a:r>
-              <a:rPr lang="en-US" sz="2000" b="1" dirty="0" smtClean="0"/>
-              <a:t>API URL </a:t>
+              <a:t>REST API URL </a:t>
             </a:r>
             <a:r>
               <a:rPr lang="en-US" sz="2000" dirty="0" smtClean="0"/>
@@ -21647,11 +21622,7 @@
             </a:pPr>
             <a:r>
               <a:rPr lang="en-US" sz="2000" dirty="0" smtClean="0"/>
-              <a:t>Change the </a:t>
-            </a:r>
-            <a:r>
-              <a:rPr lang="en-US" sz="2000" dirty="0" smtClean="0"/>
-              <a:t>Codelist and DSD identifiers (</a:t>
+              <a:t>Change the Codelist and DSD identifiers (</a:t>
             </a:r>
             <a:r>
               <a:rPr lang="en-US" sz="2000" b="1" dirty="0" smtClean="0"/>
@@ -21683,15 +21654,7 @@
             </a:r>
             <a:r>
               <a:rPr lang="en-US" sz="2000" dirty="0" smtClean="0"/>
-              <a:t> </a:t>
-            </a:r>
-            <a:r>
-              <a:rPr lang="en-US" sz="2000" dirty="0" smtClean="0"/>
-              <a:t>fields) to </a:t>
-            </a:r>
-            <a:r>
-              <a:rPr lang="en-US" sz="2000" dirty="0" smtClean="0"/>
-              <a:t>reflect that you have taken ownership of the artefacts</a:t>
+              <a:t> fields) to reflect that you have taken ownership of the artefacts</a:t>
             </a:r>
           </a:p>
           <a:p>
@@ -22274,6 +22237,12 @@
 </file>
 
 <file path=customXml/item1.xml><?xml version="1.0" encoding="utf-8"?>
+<p:properties xmlns:p="http://schemas.microsoft.com/office/2006/metadata/properties" xmlns:xsi="http://www.w3.org/2001/XMLSchema-instance" xmlns:pc="http://schemas.microsoft.com/office/infopath/2007/PartnerControls">
+  <documentManagement/>
+</p:properties>
+</file>
+
+<file path=customXml/item2.xml><?xml version="1.0" encoding="utf-8"?>
 <ct:contentTypeSchema xmlns:ct="http://schemas.microsoft.com/office/2006/metadata/contentType" xmlns:ma="http://schemas.microsoft.com/office/2006/metadata/properties/metaAttributes" ct:_="" ma:_="" ma:contentTypeName="Document" ma:contentTypeID="0x010100B19E1A0713893144A00CC00F214B71AE" ma:contentTypeVersion="12" ma:contentTypeDescription="Crée un document." ma:contentTypeScope="" ma:versionID="f320d9b6cd89c9e2792e99ba94d6db05">
   <xsd:schema xmlns:xsd="http://www.w3.org/2001/XMLSchema" xmlns:xs="http://www.w3.org/2001/XMLSchema" xmlns:p="http://schemas.microsoft.com/office/2006/metadata/properties" xmlns:ns3="626d4039-44a3-4f34-a939-9e74c9a193d1" xmlns:ns4="607381c3-0f53-441d-8dd9-b46e64774622" targetNamespace="http://schemas.microsoft.com/office/2006/metadata/properties" ma:root="true" ma:fieldsID="535494a8f95013fed6ea1b4d445252b0" ns3:_="" ns4:_="">
     <xsd:import namespace="626d4039-44a3-4f34-a939-9e74c9a193d1"/>
@@ -22490,12 +22459,6 @@
 </ct:contentTypeSchema>
 </file>
 
-<file path=customXml/item2.xml><?xml version="1.0" encoding="utf-8"?>
-<p:properties xmlns:p="http://schemas.microsoft.com/office/2006/metadata/properties" xmlns:xsi="http://www.w3.org/2001/XMLSchema-instance" xmlns:pc="http://schemas.microsoft.com/office/infopath/2007/PartnerControls">
-  <documentManagement/>
-</p:properties>
-</file>
-
 <file path=customXml/item3.xml><?xml version="1.0" encoding="utf-8"?>
 <?mso-contentType ?>
 <FormTemplates xmlns="http://schemas.microsoft.com/sharepoint/v3/contenttype/forms">
@@ -22506,6 +22469,23 @@
 </file>
 
 <file path=customXml/itemProps1.xml><?xml version="1.0" encoding="utf-8"?>
+<ds:datastoreItem xmlns:ds="http://schemas.openxmlformats.org/officeDocument/2006/customXml" ds:itemID="{9AC980C5-8878-4068-AFEA-A29CB527EB66}">
+  <ds:schemaRefs>
+    <ds:schemaRef ds:uri="http://schemas.microsoft.com/office/infopath/2007/PartnerControls"/>
+    <ds:schemaRef ds:uri="626d4039-44a3-4f34-a939-9e74c9a193d1"/>
+    <ds:schemaRef ds:uri="http://purl.org/dc/elements/1.1/"/>
+    <ds:schemaRef ds:uri="http://schemas.microsoft.com/office/2006/metadata/properties"/>
+    <ds:schemaRef ds:uri="http://schemas.microsoft.com/office/2006/documentManagement/types"/>
+    <ds:schemaRef ds:uri="http://purl.org/dc/terms/"/>
+    <ds:schemaRef ds:uri="607381c3-0f53-441d-8dd9-b46e64774622"/>
+    <ds:schemaRef ds:uri="http://purl.org/dc/dcmitype/"/>
+    <ds:schemaRef ds:uri="http://schemas.openxmlformats.org/package/2006/metadata/core-properties"/>
+    <ds:schemaRef ds:uri="http://www.w3.org/XML/1998/namespace"/>
+  </ds:schemaRefs>
+</ds:datastoreItem>
+</file>
+
+<file path=customXml/itemProps2.xml><?xml version="1.0" encoding="utf-8"?>
 <ds:datastoreItem xmlns:ds="http://schemas.openxmlformats.org/officeDocument/2006/customXml" ds:itemID="{5FE6498F-712E-43F2-B17E-0E50CB30D53F}">
   <ds:schemaRefs>
     <ds:schemaRef ds:uri="http://schemas.microsoft.com/office/2006/metadata/contentType"/>
@@ -22524,23 +22504,6 @@
 </ds:datastoreItem>
 </file>
 
-<file path=customXml/itemProps2.xml><?xml version="1.0" encoding="utf-8"?>
-<ds:datastoreItem xmlns:ds="http://schemas.openxmlformats.org/officeDocument/2006/customXml" ds:itemID="{9AC980C5-8878-4068-AFEA-A29CB527EB66}">
-  <ds:schemaRefs>
-    <ds:schemaRef ds:uri="http://schemas.microsoft.com/office/2006/documentManagement/types"/>
-    <ds:schemaRef ds:uri="626d4039-44a3-4f34-a939-9e74c9a193d1"/>
-    <ds:schemaRef ds:uri="http://purl.org/dc/elements/1.1/"/>
-    <ds:schemaRef ds:uri="http://schemas.microsoft.com/office/2006/metadata/properties"/>
-    <ds:schemaRef ds:uri="http://purl.org/dc/terms/"/>
-    <ds:schemaRef ds:uri="607381c3-0f53-441d-8dd9-b46e64774622"/>
-    <ds:schemaRef ds:uri="http://purl.org/dc/dcmitype/"/>
-    <ds:schemaRef ds:uri="http://schemas.microsoft.com/office/infopath/2007/PartnerControls"/>
-    <ds:schemaRef ds:uri="http://schemas.openxmlformats.org/package/2006/metadata/core-properties"/>
-    <ds:schemaRef ds:uri="http://www.w3.org/XML/1998/namespace"/>
-  </ds:schemaRefs>
-</ds:datastoreItem>
-</file>
-
 <file path=customXml/itemProps3.xml><?xml version="1.0" encoding="utf-8"?>
 <ds:datastoreItem xmlns:ds="http://schemas.openxmlformats.org/officeDocument/2006/customXml" ds:itemID="{93EF0B64-D188-4030-9FB6-D7F408416CE6}">
   <ds:schemaRefs>

</xml_diff>